<commit_message>
docs: añadidos a memoria y presentación
</commit_message>
<xml_diff>
--- a/docs/presentacion.pptx
+++ b/docs/presentacion.pptx
@@ -304,7 +304,7 @@
             <a:fld id="{045C9ACF-B5BA-4A7D-9AFB-510D50510C08}" type="datetimeFigureOut">
               <a:rPr lang="es-ES" smtClean="0"/>
               <a:pPr/>
-              <a:t>13/04/2016</a:t>
+              <a:t>20/05/2016</a:t>
             </a:fld>
             <a:endParaRPr lang="es-ES"/>
           </a:p>
@@ -471,7 +471,7 @@
             <a:fld id="{045C9ACF-B5BA-4A7D-9AFB-510D50510C08}" type="datetimeFigureOut">
               <a:rPr lang="es-ES" smtClean="0"/>
               <a:pPr/>
-              <a:t>13/04/2016</a:t>
+              <a:t>20/05/2016</a:t>
             </a:fld>
             <a:endParaRPr lang="es-ES"/>
           </a:p>
@@ -648,7 +648,7 @@
             <a:fld id="{045C9ACF-B5BA-4A7D-9AFB-510D50510C08}" type="datetimeFigureOut">
               <a:rPr lang="es-ES" smtClean="0"/>
               <a:pPr/>
-              <a:t>13/04/2016</a:t>
+              <a:t>20/05/2016</a:t>
             </a:fld>
             <a:endParaRPr lang="es-ES"/>
           </a:p>
@@ -815,7 +815,7 @@
             <a:fld id="{045C9ACF-B5BA-4A7D-9AFB-510D50510C08}" type="datetimeFigureOut">
               <a:rPr lang="es-ES" smtClean="0"/>
               <a:pPr/>
-              <a:t>13/04/2016</a:t>
+              <a:t>20/05/2016</a:t>
             </a:fld>
             <a:endParaRPr lang="es-ES"/>
           </a:p>
@@ -1058,7 +1058,7 @@
             <a:fld id="{045C9ACF-B5BA-4A7D-9AFB-510D50510C08}" type="datetimeFigureOut">
               <a:rPr lang="es-ES" smtClean="0"/>
               <a:pPr/>
-              <a:t>13/04/2016</a:t>
+              <a:t>20/05/2016</a:t>
             </a:fld>
             <a:endParaRPr lang="es-ES"/>
           </a:p>
@@ -1343,7 +1343,7 @@
             <a:fld id="{045C9ACF-B5BA-4A7D-9AFB-510D50510C08}" type="datetimeFigureOut">
               <a:rPr lang="es-ES" smtClean="0"/>
               <a:pPr/>
-              <a:t>13/04/2016</a:t>
+              <a:t>20/05/2016</a:t>
             </a:fld>
             <a:endParaRPr lang="es-ES"/>
           </a:p>
@@ -1762,7 +1762,7 @@
             <a:fld id="{045C9ACF-B5BA-4A7D-9AFB-510D50510C08}" type="datetimeFigureOut">
               <a:rPr lang="es-ES" smtClean="0"/>
               <a:pPr/>
-              <a:t>13/04/2016</a:t>
+              <a:t>20/05/2016</a:t>
             </a:fld>
             <a:endParaRPr lang="es-ES"/>
           </a:p>
@@ -1877,7 +1877,7 @@
             <a:fld id="{045C9ACF-B5BA-4A7D-9AFB-510D50510C08}" type="datetimeFigureOut">
               <a:rPr lang="es-ES" smtClean="0"/>
               <a:pPr/>
-              <a:t>13/04/2016</a:t>
+              <a:t>20/05/2016</a:t>
             </a:fld>
             <a:endParaRPr lang="es-ES"/>
           </a:p>
@@ -1969,7 +1969,7 @@
             <a:fld id="{045C9ACF-B5BA-4A7D-9AFB-510D50510C08}" type="datetimeFigureOut">
               <a:rPr lang="es-ES" smtClean="0"/>
               <a:pPr/>
-              <a:t>13/04/2016</a:t>
+              <a:t>20/05/2016</a:t>
             </a:fld>
             <a:endParaRPr lang="es-ES"/>
           </a:p>
@@ -2243,7 +2243,7 @@
             <a:fld id="{045C9ACF-B5BA-4A7D-9AFB-510D50510C08}" type="datetimeFigureOut">
               <a:rPr lang="es-ES" smtClean="0"/>
               <a:pPr/>
-              <a:t>13/04/2016</a:t>
+              <a:t>20/05/2016</a:t>
             </a:fld>
             <a:endParaRPr lang="es-ES"/>
           </a:p>
@@ -2493,7 +2493,7 @@
             <a:fld id="{045C9ACF-B5BA-4A7D-9AFB-510D50510C08}" type="datetimeFigureOut">
               <a:rPr lang="es-ES" smtClean="0"/>
               <a:pPr/>
-              <a:t>13/04/2016</a:t>
+              <a:t>20/05/2016</a:t>
             </a:fld>
             <a:endParaRPr lang="es-ES"/>
           </a:p>
@@ -2703,7 +2703,7 @@
             <a:fld id="{045C9ACF-B5BA-4A7D-9AFB-510D50510C08}" type="datetimeFigureOut">
               <a:rPr lang="es-ES" smtClean="0"/>
               <a:pPr/>
-              <a:t>13/04/2016</a:t>
+              <a:t>20/05/2016</a:t>
             </a:fld>
             <a:endParaRPr lang="es-ES"/>
           </a:p>
@@ -3152,7 +3152,7 @@
         </p:blipFill>
         <p:spPr bwMode="auto">
           <a:xfrm>
-            <a:off x="2928930" y="500043"/>
+            <a:off x="2786050" y="285728"/>
             <a:ext cx="3600475" cy="642943"/>
           </a:xfrm>
           <a:prstGeom prst="rect">
@@ -3443,9 +3443,68 @@
           </a:p>
         </p:txBody>
       </p:sp>
+      <p:sp>
+        <p:nvSpPr>
+          <p:cNvPr id="10" name="1 Título"/>
+          <p:cNvSpPr txBox="1">
+            <a:spLocks/>
+          </p:cNvSpPr>
+          <p:nvPr/>
+        </p:nvSpPr>
+        <p:spPr>
+          <a:xfrm>
+            <a:off x="0" y="714356"/>
+            <a:ext cx="9144000" cy="1357322"/>
+          </a:xfrm>
+          <a:prstGeom prst="rect">
+            <a:avLst/>
+          </a:prstGeom>
+        </p:spPr>
+        <p:txBody>
+          <a:bodyPr vert="horz" lIns="91440" tIns="45720" rIns="91440" bIns="45720" rtlCol="0" anchor="ctr">
+            <a:normAutofit/>
+          </a:bodyPr>
+          <a:lstStyle/>
+          <a:p>
+            <a:pPr marL="0" marR="0" lvl="0" indent="0" algn="ctr" defTabSz="914400" rtl="0" eaLnBrk="1" fontAlgn="auto" latinLnBrk="0" hangingPunct="1">
+              <a:lnSpc>
+                <a:spcPct val="100000"/>
+              </a:lnSpc>
+              <a:spcBef>
+                <a:spcPct val="0"/>
+              </a:spcBef>
+              <a:spcAft>
+                <a:spcPts val="0"/>
+              </a:spcAft>
+              <a:buClrTx/>
+              <a:buSzTx/>
+              <a:buFontTx/>
+              <a:buNone/>
+              <a:tabLst/>
+              <a:defRPr/>
+            </a:pPr>
+            <a:r>
+              <a:rPr lang="es-ES" sz="3200" dirty="0" smtClean="0">
+                <a:latin typeface="Underwood Champion" pitchFamily="2" charset="0"/>
+                <a:ea typeface="+mj-ea"/>
+                <a:cs typeface="+mj-cs"/>
+              </a:rPr>
+              <a:t>¡Echémosle una mano a los zurdos</a:t>
+            </a:r>
+            <a:r>
+              <a:rPr lang="es-ES" sz="3200" dirty="0" smtClean="0">
+                <a:latin typeface="Underwood Champion" pitchFamily="2" charset="0"/>
+                <a:ea typeface="+mj-ea"/>
+                <a:cs typeface="+mj-cs"/>
+              </a:rPr>
+              <a:t>!</a:t>
+            </a:r>
+          </a:p>
+        </p:txBody>
+      </p:sp>
       <p:pic>
         <p:nvPicPr>
-          <p:cNvPr id="9" name="Picture 2" descr="C:\Users\Miguel\PendriveFlorida\Proyecto\cosas\zurdos_friendly.png"/>
+          <p:cNvPr id="3074" name="Picture 2"/>
           <p:cNvPicPr>
             <a:picLocks noChangeAspect="1" noChangeArrowheads="1"/>
           </p:cNvPicPr>
@@ -3460,80 +3519,22 @@
         </p:blipFill>
         <p:spPr bwMode="auto">
           <a:xfrm>
-            <a:off x="2000232" y="2428868"/>
-            <a:ext cx="5610265" cy="2714644"/>
+            <a:off x="1071538" y="2285992"/>
+            <a:ext cx="7072313" cy="3441700"/>
           </a:xfrm>
           <a:prstGeom prst="rect">
             <a:avLst/>
           </a:prstGeom>
           <a:noFill/>
+          <a:ln w="9525">
+            <a:noFill/>
+            <a:miter lim="800000"/>
+            <a:headEnd/>
+            <a:tailEnd/>
+          </a:ln>
+          <a:effectLst/>
         </p:spPr>
       </p:pic>
-      <p:sp>
-        <p:nvSpPr>
-          <p:cNvPr id="10" name="1 Título"/>
-          <p:cNvSpPr txBox="1">
-            <a:spLocks/>
-          </p:cNvSpPr>
-          <p:nvPr/>
-        </p:nvSpPr>
-        <p:spPr>
-          <a:xfrm>
-            <a:off x="0" y="714356"/>
-            <a:ext cx="9144000" cy="1357322"/>
-          </a:xfrm>
-          <a:prstGeom prst="rect">
-            <a:avLst/>
-          </a:prstGeom>
-        </p:spPr>
-        <p:txBody>
-          <a:bodyPr vert="horz" lIns="91440" tIns="45720" rIns="91440" bIns="45720" rtlCol="0" anchor="ctr">
-            <a:normAutofit/>
-          </a:bodyPr>
-          <a:lstStyle/>
-          <a:p>
-            <a:pPr marL="0" marR="0" lvl="0" indent="0" algn="ctr" defTabSz="914400" rtl="0" eaLnBrk="1" fontAlgn="auto" latinLnBrk="0" hangingPunct="1">
-              <a:lnSpc>
-                <a:spcPct val="100000"/>
-              </a:lnSpc>
-              <a:spcBef>
-                <a:spcPct val="0"/>
-              </a:spcBef>
-              <a:spcAft>
-                <a:spcPts val="0"/>
-              </a:spcAft>
-              <a:buClrTx/>
-              <a:buSzTx/>
-              <a:buFontTx/>
-              <a:buNone/>
-              <a:tabLst/>
-              <a:defRPr/>
-            </a:pPr>
-            <a:r>
-              <a:rPr lang="es-ES" sz="3200" dirty="0" smtClean="0">
-                <a:latin typeface="Underwood Champion" pitchFamily="2" charset="0"/>
-                <a:ea typeface="+mj-ea"/>
-                <a:cs typeface="+mj-cs"/>
-              </a:rPr>
-              <a:t>¡Echémosle una mano a los zurdos!</a:t>
-            </a:r>
-            <a:endParaRPr kumimoji="0" lang="es-ES" sz="3200" b="0" i="0" u="none" strike="noStrike" kern="1200" cap="none" spc="0" normalizeH="0" baseline="0" noProof="0" dirty="0" smtClean="0">
-              <a:ln>
-                <a:noFill/>
-              </a:ln>
-              <a:solidFill>
-                <a:schemeClr val="tx1"/>
-              </a:solidFill>
-              <a:effectLst/>
-              <a:uLnTx/>
-              <a:uFillTx/>
-              <a:latin typeface="Underwood Champion" pitchFamily="2" charset="0"/>
-              <a:ea typeface="+mj-ea"/>
-              <a:cs typeface="+mj-cs"/>
-            </a:endParaRPr>
-          </a:p>
-        </p:txBody>
-      </p:sp>
     </p:spTree>
   </p:cSld>
   <p:clrMapOvr>
@@ -3713,8 +3714,34 @@
         </p:blipFill>
         <p:spPr bwMode="auto">
           <a:xfrm>
-            <a:off x="3000364" y="4429132"/>
-            <a:ext cx="3143272" cy="1520938"/>
+            <a:off x="7305694" y="214290"/>
+            <a:ext cx="1624023" cy="785818"/>
+          </a:xfrm>
+          <a:prstGeom prst="rect">
+            <a:avLst/>
+          </a:prstGeom>
+          <a:noFill/>
+        </p:spPr>
+      </p:pic>
+      <p:pic>
+        <p:nvPicPr>
+          <p:cNvPr id="4098" name="Picture 2" descr="C:\Users\Miguel\PendriveFlorida\Proyecto\cosas\app31.png"/>
+          <p:cNvPicPr>
+            <a:picLocks noChangeAspect="1" noChangeArrowheads="1"/>
+          </p:cNvPicPr>
+          <p:nvPr/>
+        </p:nvPicPr>
+        <p:blipFill>
+          <a:blip r:embed="rId3" cstate="print"/>
+          <a:srcRect/>
+          <a:stretch>
+            <a:fillRect/>
+          </a:stretch>
+        </p:blipFill>
+        <p:spPr bwMode="auto">
+          <a:xfrm>
+            <a:off x="428596" y="1214422"/>
+            <a:ext cx="8280000" cy="4749326"/>
           </a:xfrm>
           <a:prstGeom prst="rect">
             <a:avLst/>
@@ -3886,7 +3913,7 @@
       </p:sp>
       <p:pic>
         <p:nvPicPr>
-          <p:cNvPr id="9" name="Picture 2" descr="C:\Users\Miguel\PendriveFlorida\Proyecto\cosas\zurdos_friendly.png"/>
+          <p:cNvPr id="6" name="Picture 2" descr="C:\Users\Miguel\PendriveFlorida\Proyecto\cosas\zurdos_friendly.png"/>
           <p:cNvPicPr>
             <a:picLocks noChangeAspect="1" noChangeArrowheads="1"/>
           </p:cNvPicPr>
@@ -3901,8 +3928,34 @@
         </p:blipFill>
         <p:spPr bwMode="auto">
           <a:xfrm>
-            <a:off x="3000364" y="4429132"/>
-            <a:ext cx="3143272" cy="1520938"/>
+            <a:off x="7305694" y="214290"/>
+            <a:ext cx="1624023" cy="785818"/>
+          </a:xfrm>
+          <a:prstGeom prst="rect">
+            <a:avLst/>
+          </a:prstGeom>
+          <a:noFill/>
+        </p:spPr>
+      </p:pic>
+      <p:pic>
+        <p:nvPicPr>
+          <p:cNvPr id="5122" name="Picture 2" descr="C:\Users\Miguel\PendriveFlorida\Proyecto\cosas\app12.png"/>
+          <p:cNvPicPr>
+            <a:picLocks noChangeAspect="1" noChangeArrowheads="1"/>
+          </p:cNvPicPr>
+          <p:nvPr/>
+        </p:nvPicPr>
+        <p:blipFill>
+          <a:blip r:embed="rId3" cstate="print"/>
+          <a:srcRect/>
+          <a:stretch>
+            <a:fillRect/>
+          </a:stretch>
+        </p:blipFill>
+        <p:spPr bwMode="auto">
+          <a:xfrm>
+            <a:off x="428596" y="1214422"/>
+            <a:ext cx="8280000" cy="4749326"/>
           </a:xfrm>
           <a:prstGeom prst="rect">
             <a:avLst/>
@@ -4234,6 +4287,32 @@
           </a:p>
         </p:txBody>
       </p:sp>
+      <p:pic>
+        <p:nvPicPr>
+          <p:cNvPr id="6146" name="Picture 2" descr="C:\Users\Miguel\PendriveFlorida\Proyecto\cosas\app13.png"/>
+          <p:cNvPicPr>
+            <a:picLocks noChangeAspect="1" noChangeArrowheads="1"/>
+          </p:cNvPicPr>
+          <p:nvPr/>
+        </p:nvPicPr>
+        <p:blipFill>
+          <a:blip r:embed="rId2" cstate="print"/>
+          <a:srcRect/>
+          <a:stretch>
+            <a:fillRect/>
+          </a:stretch>
+        </p:blipFill>
+        <p:spPr bwMode="auto">
+          <a:xfrm>
+            <a:off x="428596" y="1142984"/>
+            <a:ext cx="8280000" cy="4762428"/>
+          </a:xfrm>
+          <a:prstGeom prst="rect">
+            <a:avLst/>
+          </a:prstGeom>
+          <a:noFill/>
+        </p:spPr>
+      </p:pic>
     </p:spTree>
   </p:cSld>
   <p:clrMapOvr>
@@ -4617,7 +4696,19 @@
               <a:rPr lang="es-ES" sz="6000" dirty="0" smtClean="0">
                 <a:latin typeface="Underwood Champion" pitchFamily="2" charset="0"/>
               </a:rPr>
-              <a:t>Benito G. G.</a:t>
+              <a:t>Benito </a:t>
+            </a:r>
+            <a:r>
+              <a:rPr lang="es-ES" sz="6000" dirty="0" smtClean="0">
+                <a:latin typeface="Underwood Champion" pitchFamily="2" charset="0"/>
+              </a:rPr>
+              <a:t>G.G</a:t>
+            </a:r>
+            <a:r>
+              <a:rPr lang="es-ES" sz="6000" dirty="0" smtClean="0">
+                <a:latin typeface="Underwood Champion" pitchFamily="2" charset="0"/>
+              </a:rPr>
+              <a:t>.</a:t>
             </a:r>
             <a:endParaRPr lang="es-ES" sz="6000" dirty="0">
               <a:latin typeface="Underwood Champion" pitchFamily="2" charset="0"/>
@@ -4625,32 +4716,6 @@
           </a:p>
         </p:txBody>
       </p:sp>
-      <p:pic>
-        <p:nvPicPr>
-          <p:cNvPr id="2050" name="Picture 2" descr="C:\Users\Miguel\PendriveFlorida\Proyecto\cosas\benito_color.png"/>
-          <p:cNvPicPr>
-            <a:picLocks noChangeAspect="1" noChangeArrowheads="1"/>
-          </p:cNvPicPr>
-          <p:nvPr/>
-        </p:nvPicPr>
-        <p:blipFill>
-          <a:blip r:embed="rId2" cstate="print"/>
-          <a:srcRect/>
-          <a:stretch>
-            <a:fillRect/>
-          </a:stretch>
-        </p:blipFill>
-        <p:spPr bwMode="auto">
-          <a:xfrm>
-            <a:off x="0" y="1241080"/>
-            <a:ext cx="4214810" cy="5616923"/>
-          </a:xfrm>
-          <a:prstGeom prst="rect">
-            <a:avLst/>
-          </a:prstGeom>
-          <a:noFill/>
-        </p:spPr>
-      </p:pic>
       <p:sp>
         <p:nvSpPr>
           <p:cNvPr id="5" name="1 Título"/>
@@ -4812,6 +4877,39 @@
           </a:p>
         </p:txBody>
       </p:sp>
+      <p:pic>
+        <p:nvPicPr>
+          <p:cNvPr id="1027" name="Picture 3"/>
+          <p:cNvPicPr>
+            <a:picLocks noChangeAspect="1" noChangeArrowheads="1"/>
+          </p:cNvPicPr>
+          <p:nvPr/>
+        </p:nvPicPr>
+        <p:blipFill>
+          <a:blip r:embed="rId2" cstate="print"/>
+          <a:srcRect/>
+          <a:stretch>
+            <a:fillRect/>
+          </a:stretch>
+        </p:blipFill>
+        <p:spPr bwMode="auto">
+          <a:xfrm>
+            <a:off x="0" y="1200150"/>
+            <a:ext cx="4248150" cy="5657850"/>
+          </a:xfrm>
+          <a:prstGeom prst="rect">
+            <a:avLst/>
+          </a:prstGeom>
+          <a:noFill/>
+          <a:ln w="9525">
+            <a:noFill/>
+            <a:miter lim="800000"/>
+            <a:headEnd/>
+            <a:tailEnd/>
+          </a:ln>
+          <a:effectLst/>
+        </p:spPr>
+      </p:pic>
     </p:spTree>
   </p:cSld>
   <p:clrMapOvr>
@@ -4927,7 +5025,7 @@
         </p:nvSpPr>
         <p:spPr>
           <a:xfrm>
-            <a:off x="571472" y="5357826"/>
+            <a:off x="0" y="5214950"/>
             <a:ext cx="3000396" cy="714380"/>
           </a:xfrm>
           <a:prstGeom prst="rect">
@@ -4992,7 +5090,7 @@
         </p:nvSpPr>
         <p:spPr>
           <a:xfrm>
-            <a:off x="5357818" y="5286388"/>
+            <a:off x="4286248" y="5214950"/>
             <a:ext cx="3000396" cy="714380"/>
           </a:xfrm>
           <a:prstGeom prst="rect">
@@ -5047,6 +5145,74 @@
           </a:p>
         </p:txBody>
       </p:sp>
+      <p:pic>
+        <p:nvPicPr>
+          <p:cNvPr id="2050" name="Picture 2" descr="C:\Users\Miguel\PendriveFlorida\Proyecto\cosas\app3.png"/>
+          <p:cNvPicPr>
+            <a:picLocks noChangeAspect="1" noChangeArrowheads="1"/>
+          </p:cNvPicPr>
+          <p:nvPr/>
+        </p:nvPicPr>
+        <p:blipFill>
+          <a:blip r:embed="rId2" cstate="print"/>
+          <a:srcRect/>
+          <a:stretch>
+            <a:fillRect/>
+          </a:stretch>
+        </p:blipFill>
+        <p:spPr bwMode="auto">
+          <a:xfrm>
+            <a:off x="357158" y="1285860"/>
+            <a:ext cx="2201848" cy="3420000"/>
+          </a:xfrm>
+          <a:prstGeom prst="rect">
+            <a:avLst/>
+          </a:prstGeom>
+          <a:noFill/>
+          <a:ln>
+            <a:solidFill>
+              <a:schemeClr val="tx1">
+                <a:lumMod val="50000"/>
+                <a:lumOff val="50000"/>
+              </a:schemeClr>
+            </a:solidFill>
+          </a:ln>
+        </p:spPr>
+      </p:pic>
+      <p:pic>
+        <p:nvPicPr>
+          <p:cNvPr id="2051" name="Picture 3" descr="C:\Users\Miguel\PendriveFlorida\Proyecto\cosas\app12.png"/>
+          <p:cNvPicPr>
+            <a:picLocks noChangeAspect="1" noChangeArrowheads="1"/>
+          </p:cNvPicPr>
+          <p:nvPr/>
+        </p:nvPicPr>
+        <p:blipFill>
+          <a:blip r:embed="rId3" cstate="print"/>
+          <a:srcRect/>
+          <a:stretch>
+            <a:fillRect/>
+          </a:stretch>
+        </p:blipFill>
+        <p:spPr bwMode="auto">
+          <a:xfrm>
+            <a:off x="2857488" y="1285860"/>
+            <a:ext cx="5962446" cy="3420000"/>
+          </a:xfrm>
+          <a:prstGeom prst="rect">
+            <a:avLst/>
+          </a:prstGeom>
+          <a:noFill/>
+          <a:ln>
+            <a:solidFill>
+              <a:schemeClr val="tx1">
+                <a:lumMod val="50000"/>
+                <a:lumOff val="50000"/>
+              </a:schemeClr>
+            </a:solidFill>
+          </a:ln>
+        </p:spPr>
+      </p:pic>
     </p:spTree>
   </p:cSld>
   <p:clrMapOvr>
@@ -5383,20 +5549,6 @@
               </a:rPr>
               <a:t>Recursos</a:t>
             </a:r>
-            <a:endParaRPr kumimoji="0" lang="es-ES" sz="3200" b="0" i="0" u="none" strike="noStrike" kern="1200" cap="none" spc="0" normalizeH="0" baseline="0" noProof="0" dirty="0" smtClean="0">
-              <a:ln>
-                <a:noFill/>
-              </a:ln>
-              <a:solidFill>
-                <a:schemeClr val="tx1"/>
-              </a:solidFill>
-              <a:effectLst/>
-              <a:uLnTx/>
-              <a:uFillTx/>
-              <a:latin typeface="Underwood Champion" pitchFamily="2" charset="0"/>
-              <a:ea typeface="+mj-ea"/>
-              <a:cs typeface="+mj-cs"/>
-            </a:endParaRPr>
           </a:p>
         </p:txBody>
       </p:sp>
@@ -5463,26 +5615,6 @@
               </a:rPr>
               <a:t>+</a:t>
             </a:r>
-            <a:endParaRPr kumimoji="0" lang="es-ES" sz="9600" b="0" i="0" u="none" strike="noStrike" kern="1200" cap="none" spc="0" normalizeH="0" baseline="0" noProof="0" dirty="0" smtClean="0">
-              <a:ln>
-                <a:noFill/>
-              </a:ln>
-              <a:solidFill>
-                <a:srgbClr val="FF0000"/>
-              </a:solidFill>
-              <a:effectLst>
-                <a:outerShdw blurRad="50800" dist="38100" dir="2700000" algn="tl" rotWithShape="0">
-                  <a:prstClr val="black">
-                    <a:alpha val="40000"/>
-                  </a:prstClr>
-                </a:outerShdw>
-              </a:effectLst>
-              <a:uLnTx/>
-              <a:uFillTx/>
-              <a:latin typeface="Tahoma" pitchFamily="34" charset="0"/>
-              <a:ea typeface="Tahoma" pitchFamily="34" charset="0"/>
-              <a:cs typeface="Tahoma" pitchFamily="34" charset="0"/>
-            </a:endParaRPr>
           </a:p>
         </p:txBody>
       </p:sp>
@@ -5611,6 +5743,142 @@
               </a:ln>
               <a:solidFill>
                 <a:schemeClr val="tx1"/>
+              </a:solidFill>
+              <a:effectLst/>
+              <a:uLnTx/>
+              <a:uFillTx/>
+              <a:latin typeface="Underwood Champion" pitchFamily="2" charset="0"/>
+              <a:ea typeface="+mj-ea"/>
+              <a:cs typeface="+mj-cs"/>
+            </a:endParaRPr>
+          </a:p>
+        </p:txBody>
+      </p:sp>
+      <p:sp>
+        <p:nvSpPr>
+          <p:cNvPr id="9" name="1 Título"/>
+          <p:cNvSpPr txBox="1">
+            <a:spLocks/>
+          </p:cNvSpPr>
+          <p:nvPr/>
+        </p:nvSpPr>
+        <p:spPr>
+          <a:xfrm>
+            <a:off x="785786" y="857232"/>
+            <a:ext cx="2428892" cy="1143008"/>
+          </a:xfrm>
+          <a:prstGeom prst="rect">
+            <a:avLst/>
+          </a:prstGeom>
+        </p:spPr>
+        <p:txBody>
+          <a:bodyPr vert="horz" lIns="91440" tIns="45720" rIns="91440" bIns="45720" rtlCol="0" anchor="ctr">
+            <a:normAutofit/>
+          </a:bodyPr>
+          <a:lstStyle/>
+          <a:p>
+            <a:pPr marL="0" marR="0" lvl="0" indent="0" algn="ctr" defTabSz="914400" rtl="0" eaLnBrk="1" fontAlgn="auto" latinLnBrk="0" hangingPunct="1">
+              <a:lnSpc>
+                <a:spcPct val="100000"/>
+              </a:lnSpc>
+              <a:spcBef>
+                <a:spcPct val="0"/>
+              </a:spcBef>
+              <a:spcAft>
+                <a:spcPts val="0"/>
+              </a:spcAft>
+              <a:buClrTx/>
+              <a:buSzTx/>
+              <a:buFontTx/>
+              <a:buNone/>
+              <a:tabLst/>
+              <a:defRPr/>
+            </a:pPr>
+            <a:r>
+              <a:rPr lang="es-ES" sz="3200" noProof="0" dirty="0" smtClean="0">
+                <a:solidFill>
+                  <a:srgbClr val="FF0000"/>
+                </a:solidFill>
+                <a:latin typeface="Underwood Champion" pitchFamily="2" charset="0"/>
+                <a:ea typeface="+mj-ea"/>
+                <a:cs typeface="+mj-cs"/>
+              </a:rPr>
+              <a:t>COMÚN</a:t>
+            </a:r>
+            <a:endParaRPr kumimoji="0" lang="es-ES" sz="3200" i="0" u="none" strike="noStrike" kern="1200" cap="none" spc="0" normalizeH="0" baseline="0" noProof="0" dirty="0" smtClean="0">
+              <a:ln>
+                <a:noFill/>
+              </a:ln>
+              <a:solidFill>
+                <a:srgbClr val="FF0000"/>
+              </a:solidFill>
+              <a:effectLst/>
+              <a:uLnTx/>
+              <a:uFillTx/>
+              <a:latin typeface="Underwood Champion" pitchFamily="2" charset="0"/>
+              <a:ea typeface="+mj-ea"/>
+              <a:cs typeface="+mj-cs"/>
+            </a:endParaRPr>
+          </a:p>
+        </p:txBody>
+      </p:sp>
+      <p:sp>
+        <p:nvSpPr>
+          <p:cNvPr id="10" name="1 Título"/>
+          <p:cNvSpPr txBox="1">
+            <a:spLocks/>
+          </p:cNvSpPr>
+          <p:nvPr/>
+        </p:nvSpPr>
+        <p:spPr>
+          <a:xfrm>
+            <a:off x="5715008" y="785794"/>
+            <a:ext cx="2643206" cy="1285884"/>
+          </a:xfrm>
+          <a:prstGeom prst="rect">
+            <a:avLst/>
+          </a:prstGeom>
+        </p:spPr>
+        <p:txBody>
+          <a:bodyPr vert="horz" lIns="91440" tIns="45720" rIns="91440" bIns="45720" rtlCol="0" anchor="ctr">
+            <a:normAutofit/>
+          </a:bodyPr>
+          <a:lstStyle/>
+          <a:p>
+            <a:pPr marL="0" marR="0" lvl="0" indent="0" algn="ctr" defTabSz="914400" rtl="0" eaLnBrk="1" fontAlgn="auto" latinLnBrk="0" hangingPunct="1">
+              <a:lnSpc>
+                <a:spcPct val="100000"/>
+              </a:lnSpc>
+              <a:spcBef>
+                <a:spcPct val="0"/>
+              </a:spcBef>
+              <a:spcAft>
+                <a:spcPts val="0"/>
+              </a:spcAft>
+              <a:buClrTx/>
+              <a:buSzTx/>
+              <a:buFontTx/>
+              <a:buNone/>
+              <a:tabLst/>
+              <a:defRPr/>
+            </a:pPr>
+            <a:r>
+              <a:rPr lang="es-ES" sz="3200" dirty="0" smtClean="0">
+                <a:solidFill>
+                  <a:srgbClr val="FF0000"/>
+                </a:solidFill>
+                <a:latin typeface="Underwood Champion" pitchFamily="2" charset="0"/>
+                <a:ea typeface="+mj-ea"/>
+                <a:cs typeface="+mj-cs"/>
+              </a:rPr>
+              <a:t>FLAVOR</a:t>
+            </a:r>
+            <a:endParaRPr kumimoji="0" lang="es-ES" sz="3200" b="0" i="0" u="none" strike="noStrike" kern="1200" cap="none" spc="0" normalizeH="0" baseline="0" noProof="0" dirty="0" smtClean="0">
+              <a:ln>
+                <a:noFill/>
+              </a:ln>
+              <a:solidFill>
+                <a:srgbClr val="FF0000"/>
               </a:solidFill>
               <a:effectLst/>
               <a:uLnTx/>
@@ -5764,7 +6032,7 @@
                   <a:noFill/>
                 </a:ln>
                 <a:solidFill>
-                  <a:schemeClr val="tx1"/>
+                  <a:srgbClr val="FF0000"/>
                 </a:solidFill>
                 <a:effectLst/>
                 <a:uLnTx/>
@@ -6589,8 +6857,8 @@
         </p:blipFill>
         <p:spPr bwMode="auto">
           <a:xfrm>
-            <a:off x="1000100" y="1142986"/>
-            <a:ext cx="2616200" cy="2400300"/>
+            <a:off x="571472" y="857232"/>
+            <a:ext cx="2927657" cy="2686054"/>
           </a:xfrm>
           <a:prstGeom prst="rect">
             <a:avLst/>
@@ -6605,54 +6873,27 @@
           <a:effectLst/>
         </p:spPr>
       </p:pic>
-      <p:pic>
-        <p:nvPicPr>
-          <p:cNvPr id="6" name="Picture 2" descr="C:\Users\Miguel\PendriveFlorida\Proyecto\cosas\zeta_lugar_gimnasio.png"/>
-          <p:cNvPicPr>
-            <a:picLocks noChangeAspect="1" noChangeArrowheads="1"/>
-          </p:cNvPicPr>
-          <p:nvPr/>
-        </p:nvPicPr>
-        <p:blipFill>
-          <a:blip r:embed="rId3" cstate="print"/>
-          <a:srcRect/>
-          <a:stretch>
-            <a:fillRect/>
-          </a:stretch>
-        </p:blipFill>
-        <p:spPr bwMode="auto">
-          <a:xfrm>
-            <a:off x="5786446" y="1214423"/>
-            <a:ext cx="1905000" cy="2171700"/>
-          </a:xfrm>
-          <a:prstGeom prst="rect">
-            <a:avLst/>
-          </a:prstGeom>
-          <a:noFill/>
-        </p:spPr>
-      </p:pic>
       <p:cxnSp>
         <p:nvCxnSpPr>
           <p:cNvPr id="8" name="7 Conector recto de flecha"/>
           <p:cNvCxnSpPr>
             <a:stCxn id="2050" idx="3"/>
-            <a:endCxn id="6" idx="1"/>
           </p:cNvCxnSpPr>
           <p:nvPr/>
         </p:nvCxnSpPr>
         <p:spPr>
-          <a:xfrm flipV="1">
-            <a:off x="3616300" y="2300275"/>
-            <a:ext cx="2170146" cy="42863"/>
+          <a:xfrm>
+            <a:off x="3499129" y="2200259"/>
+            <a:ext cx="2144441" cy="14295"/>
           </a:xfrm>
           <a:prstGeom prst="straightConnector1">
             <a:avLst/>
           </a:prstGeom>
-          <a:ln>
+          <a:ln w="38100">
             <a:solidFill>
               <a:srgbClr val="C00000"/>
             </a:solidFill>
-            <a:headEnd type="arrow"/>
+            <a:headEnd type="none"/>
             <a:tailEnd type="arrow"/>
           </a:ln>
         </p:spPr>
@@ -6681,7 +6922,7 @@
         </p:nvSpPr>
         <p:spPr>
           <a:xfrm>
-            <a:off x="857224" y="3357564"/>
+            <a:off x="571472" y="3357562"/>
             <a:ext cx="3000396" cy="714380"/>
           </a:xfrm>
           <a:prstGeom prst="rect">
@@ -6741,7 +6982,7 @@
         </p:nvSpPr>
         <p:spPr>
           <a:xfrm>
-            <a:off x="5357818" y="3357564"/>
+            <a:off x="5500694" y="3357562"/>
             <a:ext cx="3000396" cy="714380"/>
           </a:xfrm>
           <a:prstGeom prst="rect">
@@ -6860,7 +7101,7 @@
           <p:nvPr/>
         </p:nvPicPr>
         <p:blipFill>
-          <a:blip r:embed="rId4" cstate="print"/>
+          <a:blip r:embed="rId3" cstate="print"/>
           <a:srcRect/>
           <a:stretch>
             <a:fillRect/>
@@ -6894,7 +7135,7 @@
           <a:prstGeom prst="straightConnector1">
             <a:avLst/>
           </a:prstGeom>
-          <a:ln>
+          <a:ln w="38100">
             <a:solidFill>
               <a:srgbClr val="C00000"/>
             </a:solidFill>
@@ -6916,6 +7157,39 @@
           </a:fontRef>
         </p:style>
       </p:cxnSp>
+      <p:pic>
+        <p:nvPicPr>
+          <p:cNvPr id="7170" name="Picture 2"/>
+          <p:cNvPicPr>
+            <a:picLocks noChangeAspect="1" noChangeArrowheads="1"/>
+          </p:cNvPicPr>
+          <p:nvPr/>
+        </p:nvPicPr>
+        <p:blipFill>
+          <a:blip r:embed="rId4" cstate="print"/>
+          <a:srcRect/>
+          <a:stretch>
+            <a:fillRect/>
+          </a:stretch>
+        </p:blipFill>
+        <p:spPr bwMode="auto">
+          <a:xfrm>
+            <a:off x="5857884" y="857232"/>
+            <a:ext cx="2251695" cy="2563810"/>
+          </a:xfrm>
+          <a:prstGeom prst="rect">
+            <a:avLst/>
+          </a:prstGeom>
+          <a:noFill/>
+          <a:ln w="9525">
+            <a:noFill/>
+            <a:miter lim="800000"/>
+            <a:headEnd/>
+            <a:tailEnd/>
+          </a:ln>
+          <a:effectLst/>
+        </p:spPr>
+      </p:pic>
     </p:spTree>
   </p:cSld>
   <p:clrMapOvr>
@@ -7010,7 +7284,7 @@
       </p:sp>
       <p:pic>
         <p:nvPicPr>
-          <p:cNvPr id="1026" name="Picture 2" descr="C:\Users\Miguel\PendriveFlorida\Proyecto\cosas\zeta_lugar_gimnasio.png"/>
+          <p:cNvPr id="1027" name="Picture 3" descr="C:\Users\Miguel\PendriveFlorida\Proyecto\cosas\zeta_lugar_cl_muermo.png"/>
           <p:cNvPicPr>
             <a:picLocks noChangeAspect="1" noChangeArrowheads="1"/>
           </p:cNvPicPr>
@@ -7025,8 +7299,8 @@
         </p:blipFill>
         <p:spPr bwMode="auto">
           <a:xfrm>
-            <a:off x="214282" y="214291"/>
-            <a:ext cx="1905000" cy="2171700"/>
+            <a:off x="6643706" y="285730"/>
+            <a:ext cx="2258267" cy="1785952"/>
           </a:xfrm>
           <a:prstGeom prst="rect">
             <a:avLst/>
@@ -7036,7 +7310,7 @@
       </p:pic>
       <p:pic>
         <p:nvPicPr>
-          <p:cNvPr id="1027" name="Picture 3" descr="C:\Users\Miguel\PendriveFlorida\Proyecto\cosas\zeta_lugar_cl_muermo.png"/>
+          <p:cNvPr id="1028" name="Picture 4" descr="C:\Users\Miguel\PendriveFlorida\Proyecto\cosas\zeta_lugar_banco.png"/>
           <p:cNvPicPr>
             <a:picLocks noChangeAspect="1" noChangeArrowheads="1"/>
           </p:cNvPicPr>
@@ -7051,32 +7325,6 @@
         </p:blipFill>
         <p:spPr bwMode="auto">
           <a:xfrm>
-            <a:off x="6643706" y="285730"/>
-            <a:ext cx="2258267" cy="1785952"/>
-          </a:xfrm>
-          <a:prstGeom prst="rect">
-            <a:avLst/>
-          </a:prstGeom>
-          <a:noFill/>
-        </p:spPr>
-      </p:pic>
-      <p:pic>
-        <p:nvPicPr>
-          <p:cNvPr id="1028" name="Picture 4" descr="C:\Users\Miguel\PendriveFlorida\Proyecto\cosas\zeta_lugar_banco.png"/>
-          <p:cNvPicPr>
-            <a:picLocks noChangeAspect="1" noChangeArrowheads="1"/>
-          </p:cNvPicPr>
-          <p:nvPr/>
-        </p:nvPicPr>
-        <p:blipFill>
-          <a:blip r:embed="rId4" cstate="print"/>
-          <a:srcRect/>
-          <a:stretch>
-            <a:fillRect/>
-          </a:stretch>
-        </p:blipFill>
-        <p:spPr bwMode="auto">
-          <a:xfrm>
             <a:off x="2285984" y="4643447"/>
             <a:ext cx="2044712" cy="2025004"/>
           </a:xfrm>
@@ -7136,7 +7384,7 @@
                   <a:noFill/>
                 </a:ln>
                 <a:solidFill>
-                  <a:schemeClr val="tx1"/>
+                  <a:srgbClr val="FF0000"/>
                 </a:solidFill>
                 <a:effectLst/>
                 <a:uLnTx/>
@@ -7287,7 +7535,7 @@
           <a:prstGeom prst="straightConnector1">
             <a:avLst/>
           </a:prstGeom>
-          <a:ln>
+          <a:ln w="38100">
             <a:solidFill>
               <a:srgbClr val="C00000"/>
             </a:solidFill>
@@ -7326,7 +7574,7 @@
           <a:prstGeom prst="straightConnector1">
             <a:avLst/>
           </a:prstGeom>
-          <a:ln>
+          <a:ln w="38100">
             <a:solidFill>
               <a:srgbClr val="C00000"/>
             </a:solidFill>
@@ -7365,7 +7613,7 @@
           <a:prstGeom prst="straightConnector1">
             <a:avLst/>
           </a:prstGeom>
-          <a:ln>
+          <a:ln w="38100">
             <a:solidFill>
               <a:srgbClr val="C00000"/>
             </a:solidFill>
@@ -7387,6 +7635,32 @@
           </a:fontRef>
         </p:style>
       </p:cxnSp>
+      <p:pic>
+        <p:nvPicPr>
+          <p:cNvPr id="8194" name="Picture 2" descr="C:\Users\Miguel\PendriveFlorida\Proyecto\cosas\zeta_lugar_hotel.png"/>
+          <p:cNvPicPr>
+            <a:picLocks noChangeAspect="1" noChangeArrowheads="1"/>
+          </p:cNvPicPr>
+          <p:nvPr/>
+        </p:nvPicPr>
+        <p:blipFill>
+          <a:blip r:embed="rId4" cstate="print"/>
+          <a:srcRect/>
+          <a:stretch>
+            <a:fillRect/>
+          </a:stretch>
+        </p:blipFill>
+        <p:spPr bwMode="auto">
+          <a:xfrm>
+            <a:off x="214282" y="142852"/>
+            <a:ext cx="1992313" cy="2674937"/>
+          </a:xfrm>
+          <a:prstGeom prst="rect">
+            <a:avLst/>
+          </a:prstGeom>
+          <a:noFill/>
+        </p:spPr>
+      </p:pic>
     </p:spTree>
   </p:cSld>
   <p:clrMapOvr>

</xml_diff>